<commit_message>
Precisions on example E6 Vitamin D
</commit_message>
<xml_diff>
--- a/input/images-source/LabExampleE6Business.pptx
+++ b/input/images-source/LabExampleE6Business.pptx
@@ -259,7 +259,7 @@
           <a:p>
             <a:fld id="{5BCCFC60-1DD0-4069-8629-C8406330BC3C}" type="datetimeFigureOut">
               <a:rPr lang="fr-FR" smtClean="0"/>
-              <a:t>19/02/2020</a:t>
+              <a:t>22/02/2020</a:t>
             </a:fld>
             <a:endParaRPr lang="fr-FR"/>
           </a:p>
@@ -457,7 +457,7 @@
           <a:p>
             <a:fld id="{5BCCFC60-1DD0-4069-8629-C8406330BC3C}" type="datetimeFigureOut">
               <a:rPr lang="fr-FR" smtClean="0"/>
-              <a:t>19/02/2020</a:t>
+              <a:t>22/02/2020</a:t>
             </a:fld>
             <a:endParaRPr lang="fr-FR"/>
           </a:p>
@@ -665,7 +665,7 @@
           <a:p>
             <a:fld id="{5BCCFC60-1DD0-4069-8629-C8406330BC3C}" type="datetimeFigureOut">
               <a:rPr lang="fr-FR" smtClean="0"/>
-              <a:t>19/02/2020</a:t>
+              <a:t>22/02/2020</a:t>
             </a:fld>
             <a:endParaRPr lang="fr-FR"/>
           </a:p>
@@ -863,7 +863,7 @@
           <a:p>
             <a:fld id="{5BCCFC60-1DD0-4069-8629-C8406330BC3C}" type="datetimeFigureOut">
               <a:rPr lang="fr-FR" smtClean="0"/>
-              <a:t>19/02/2020</a:t>
+              <a:t>22/02/2020</a:t>
             </a:fld>
             <a:endParaRPr lang="fr-FR"/>
           </a:p>
@@ -1138,7 +1138,7 @@
           <a:p>
             <a:fld id="{5BCCFC60-1DD0-4069-8629-C8406330BC3C}" type="datetimeFigureOut">
               <a:rPr lang="fr-FR" smtClean="0"/>
-              <a:t>19/02/2020</a:t>
+              <a:t>22/02/2020</a:t>
             </a:fld>
             <a:endParaRPr lang="fr-FR"/>
           </a:p>
@@ -1403,7 +1403,7 @@
           <a:p>
             <a:fld id="{5BCCFC60-1DD0-4069-8629-C8406330BC3C}" type="datetimeFigureOut">
               <a:rPr lang="fr-FR" smtClean="0"/>
-              <a:t>19/02/2020</a:t>
+              <a:t>22/02/2020</a:t>
             </a:fld>
             <a:endParaRPr lang="fr-FR"/>
           </a:p>
@@ -1815,7 +1815,7 @@
           <a:p>
             <a:fld id="{5BCCFC60-1DD0-4069-8629-C8406330BC3C}" type="datetimeFigureOut">
               <a:rPr lang="fr-FR" smtClean="0"/>
-              <a:t>19/02/2020</a:t>
+              <a:t>22/02/2020</a:t>
             </a:fld>
             <a:endParaRPr lang="fr-FR"/>
           </a:p>
@@ -1956,7 +1956,7 @@
           <a:p>
             <a:fld id="{5BCCFC60-1DD0-4069-8629-C8406330BC3C}" type="datetimeFigureOut">
               <a:rPr lang="fr-FR" smtClean="0"/>
-              <a:t>19/02/2020</a:t>
+              <a:t>22/02/2020</a:t>
             </a:fld>
             <a:endParaRPr lang="fr-FR"/>
           </a:p>
@@ -2069,7 +2069,7 @@
           <a:p>
             <a:fld id="{5BCCFC60-1DD0-4069-8629-C8406330BC3C}" type="datetimeFigureOut">
               <a:rPr lang="fr-FR" smtClean="0"/>
-              <a:t>19/02/2020</a:t>
+              <a:t>22/02/2020</a:t>
             </a:fld>
             <a:endParaRPr lang="fr-FR"/>
           </a:p>
@@ -2380,7 +2380,7 @@
           <a:p>
             <a:fld id="{5BCCFC60-1DD0-4069-8629-C8406330BC3C}" type="datetimeFigureOut">
               <a:rPr lang="fr-FR" smtClean="0"/>
-              <a:t>19/02/2020</a:t>
+              <a:t>22/02/2020</a:t>
             </a:fld>
             <a:endParaRPr lang="fr-FR"/>
           </a:p>
@@ -2668,7 +2668,7 @@
           <a:p>
             <a:fld id="{5BCCFC60-1DD0-4069-8629-C8406330BC3C}" type="datetimeFigureOut">
               <a:rPr lang="fr-FR" smtClean="0"/>
-              <a:t>19/02/2020</a:t>
+              <a:t>22/02/2020</a:t>
             </a:fld>
             <a:endParaRPr lang="fr-FR"/>
           </a:p>
@@ -2909,7 +2909,7 @@
           <a:p>
             <a:fld id="{5BCCFC60-1DD0-4069-8629-C8406330BC3C}" type="datetimeFigureOut">
               <a:rPr lang="fr-FR" smtClean="0"/>
-              <a:t>19/02/2020</a:t>
+              <a:t>22/02/2020</a:t>
             </a:fld>
             <a:endParaRPr lang="fr-FR"/>
           </a:p>
@@ -3460,7 +3460,7 @@
         </p:nvSpPr>
         <p:spPr>
           <a:xfrm>
-            <a:off x="7118555" y="2386221"/>
+            <a:off x="7030611" y="1304909"/>
             <a:ext cx="2655207" cy="1077218"/>
           </a:xfrm>
           <a:prstGeom prst="rect">
@@ -3538,7 +3538,7 @@
         </p:nvSpPr>
         <p:spPr>
           <a:xfrm>
-            <a:off x="7118555" y="2076742"/>
+            <a:off x="7030611" y="995430"/>
             <a:ext cx="2655207" cy="369332"/>
           </a:xfrm>
           <a:prstGeom prst="rect">
@@ -3607,8 +3607,8 @@
         </p:nvCxnSpPr>
         <p:spPr>
           <a:xfrm flipV="1">
-            <a:off x="3778944" y="2261408"/>
-            <a:ext cx="3339611" cy="1619976"/>
+            <a:off x="3778944" y="1180096"/>
+            <a:ext cx="3251667" cy="2701288"/>
           </a:xfrm>
           <a:prstGeom prst="straightConnector1">
             <a:avLst/>
@@ -3738,7 +3738,7 @@
         </p:nvSpPr>
         <p:spPr>
           <a:xfrm>
-            <a:off x="7118555" y="3452854"/>
+            <a:off x="7030611" y="2371542"/>
             <a:ext cx="2655207" cy="1077218"/>
           </a:xfrm>
           <a:prstGeom prst="rect">
@@ -4008,7 +4008,7 @@
         </p:nvSpPr>
         <p:spPr>
           <a:xfrm>
-            <a:off x="3029575" y="1345212"/>
+            <a:off x="2104974" y="1364762"/>
             <a:ext cx="2284587" cy="1077218"/>
           </a:xfrm>
           <a:prstGeom prst="rect">
@@ -4086,7 +4086,7 @@
         </p:nvSpPr>
         <p:spPr>
           <a:xfrm>
-            <a:off x="3029575" y="1055856"/>
+            <a:off x="2109479" y="991174"/>
             <a:ext cx="2284587" cy="369332"/>
           </a:xfrm>
           <a:prstGeom prst="rect">
@@ -4154,8 +4154,8 @@
         </p:nvCxnSpPr>
         <p:spPr>
           <a:xfrm flipV="1">
-            <a:off x="2481941" y="2422430"/>
-            <a:ext cx="1689928" cy="656998"/>
+            <a:off x="2481941" y="2441980"/>
+            <a:ext cx="765327" cy="637448"/>
           </a:xfrm>
           <a:prstGeom prst="straightConnector1">
             <a:avLst/>
@@ -4198,7 +4198,7 @@
         </p:nvSpPr>
         <p:spPr>
           <a:xfrm>
-            <a:off x="1574032" y="2519233"/>
+            <a:off x="1428890" y="2621855"/>
             <a:ext cx="3219591" cy="276999"/>
           </a:xfrm>
           <a:prstGeom prst="rect">
@@ -4242,7 +4242,7 @@
         </p:nvSpPr>
         <p:spPr>
           <a:xfrm>
-            <a:off x="5233394" y="2540585"/>
+            <a:off x="5576906" y="1602778"/>
             <a:ext cx="1357446" cy="553998"/>
           </a:xfrm>
           <a:prstGeom prst="rect">
@@ -4332,30 +4332,179 @@
       </p:sp>
       <p:sp>
         <p:nvSpPr>
-          <p:cNvPr id="2" name="Espace réservé du numéro de diapositive 1">
-            <a:extLst>
-              <a:ext uri="{FF2B5EF4-FFF2-40B4-BE49-F238E27FC236}">
-                <a16:creationId xmlns:a16="http://schemas.microsoft.com/office/drawing/2014/main" id="{809B6099-BAAF-4642-9B3A-44E0AE0D66EC}"/>
-              </a:ext>
-            </a:extLst>
-          </p:cNvPr>
-          <p:cNvSpPr>
-            <a:spLocks noGrp="1"/>
-          </p:cNvSpPr>
-          <p:nvPr>
-            <p:ph type="sldNum" sz="quarter" idx="12"/>
-          </p:nvPr>
-        </p:nvSpPr>
-        <p:spPr/>
-        <p:txBody>
-          <a:bodyPr/>
-          <a:lstStyle/>
-          <a:p>
-            <a:fld id="{AB67725B-D602-4F4A-8836-D4C17398D8E4}" type="slidenum">
-              <a:rPr lang="fr-FR" smtClean="0"/>
-              <a:t>1</a:t>
-            </a:fld>
-            <a:endParaRPr lang="fr-FR"/>
+          <p:cNvPr id="3" name="Rectangle : carré corné 2">
+            <a:extLst>
+              <a:ext uri="{FF2B5EF4-FFF2-40B4-BE49-F238E27FC236}">
+                <a16:creationId xmlns:a16="http://schemas.microsoft.com/office/drawing/2014/main" id="{1B08D58F-309F-4700-BDA2-803BAFA038A7}"/>
+              </a:ext>
+            </a:extLst>
+          </p:cNvPr>
+          <p:cNvSpPr/>
+          <p:nvPr/>
+        </p:nvSpPr>
+        <p:spPr>
+          <a:xfrm>
+            <a:off x="7030611" y="4177310"/>
+            <a:ext cx="4290573" cy="2364567"/>
+          </a:xfrm>
+          <a:prstGeom prst="foldedCorner">
+            <a:avLst>
+              <a:gd name="adj" fmla="val 9170"/>
+            </a:avLst>
+          </a:prstGeom>
+          <a:solidFill>
+            <a:schemeClr val="bg1">
+              <a:lumMod val="85000"/>
+            </a:schemeClr>
+          </a:solidFill>
+          <a:ln>
+            <a:solidFill>
+              <a:schemeClr val="bg1">
+                <a:lumMod val="75000"/>
+              </a:schemeClr>
+            </a:solidFill>
+          </a:ln>
+          <a:effectLst>
+            <a:outerShdw blurRad="50800" dist="38100" dir="2700000" algn="tl" rotWithShape="0">
+              <a:prstClr val="black">
+                <a:alpha val="40000"/>
+              </a:prstClr>
+            </a:outerShdw>
+          </a:effectLst>
+        </p:spPr>
+        <p:style>
+          <a:lnRef idx="2">
+            <a:schemeClr val="accent1">
+              <a:shade val="50000"/>
+            </a:schemeClr>
+          </a:lnRef>
+          <a:fillRef idx="1">
+            <a:schemeClr val="accent1"/>
+          </a:fillRef>
+          <a:effectRef idx="0">
+            <a:schemeClr val="accent1"/>
+          </a:effectRef>
+          <a:fontRef idx="minor">
+            <a:schemeClr val="lt1"/>
+          </a:fontRef>
+        </p:style>
+        <p:txBody>
+          <a:bodyPr rtlCol="0" anchor="t" anchorCtr="0"/>
+          <a:lstStyle/>
+          <a:p>
+            <a:r>
+              <a:rPr lang="en-US" sz="1600" dirty="0">
+                <a:solidFill>
+                  <a:schemeClr val="tx1">
+                    <a:lumMod val="75000"/>
+                    <a:lumOff val="25000"/>
+                  </a:schemeClr>
+                </a:solidFill>
+              </a:rPr>
+              <a:t>Reimbursement  of this test can be claimed if reason for testing/clinical focus is one of:</a:t>
+            </a:r>
+          </a:p>
+          <a:p>
+            <a:pPr marL="285750" indent="-285750">
+              <a:buFontTx/>
+              <a:buChar char="-"/>
+            </a:pPr>
+            <a:r>
+              <a:rPr lang="en-US" sz="1600" dirty="0">
+                <a:solidFill>
+                  <a:schemeClr val="tx1">
+                    <a:lumMod val="75000"/>
+                    <a:lumOff val="25000"/>
+                  </a:schemeClr>
+                </a:solidFill>
+              </a:rPr>
+              <a:t>Rickets</a:t>
+            </a:r>
+          </a:p>
+          <a:p>
+            <a:pPr marL="285750" indent="-285750">
+              <a:buFontTx/>
+              <a:buChar char="-"/>
+            </a:pPr>
+            <a:r>
+              <a:rPr lang="en-US" sz="1600" dirty="0">
+                <a:solidFill>
+                  <a:schemeClr val="tx1">
+                    <a:lumMod val="75000"/>
+                    <a:lumOff val="25000"/>
+                  </a:schemeClr>
+                </a:solidFill>
+              </a:rPr>
+              <a:t>Osteomalacia</a:t>
+            </a:r>
+          </a:p>
+          <a:p>
+            <a:pPr marL="285750" indent="-285750">
+              <a:buFontTx/>
+              <a:buChar char="-"/>
+            </a:pPr>
+            <a:r>
+              <a:rPr lang="en-US" sz="1600" dirty="0">
+                <a:solidFill>
+                  <a:schemeClr val="tx1">
+                    <a:lumMod val="75000"/>
+                    <a:lumOff val="25000"/>
+                  </a:schemeClr>
+                </a:solidFill>
+              </a:rPr>
+              <a:t>Monitoring a transplanted kidney</a:t>
+            </a:r>
+          </a:p>
+          <a:p>
+            <a:pPr marL="285750" indent="-285750">
+              <a:buFontTx/>
+              <a:buChar char="-"/>
+            </a:pPr>
+            <a:r>
+              <a:rPr lang="en-US" sz="1600" dirty="0">
+                <a:solidFill>
+                  <a:schemeClr val="tx1">
+                    <a:lumMod val="75000"/>
+                    <a:lumOff val="25000"/>
+                  </a:schemeClr>
+                </a:solidFill>
+              </a:rPr>
+              <a:t>Assessment for bariatric surgery</a:t>
+            </a:r>
+          </a:p>
+          <a:p>
+            <a:pPr marL="285750" indent="-285750">
+              <a:buFontTx/>
+              <a:buChar char="-"/>
+            </a:pPr>
+            <a:r>
+              <a:rPr lang="en-US" sz="1600" dirty="0">
+                <a:solidFill>
+                  <a:schemeClr val="tx1">
+                    <a:lumMod val="75000"/>
+                    <a:lumOff val="25000"/>
+                  </a:schemeClr>
+                </a:solidFill>
+              </a:rPr>
+              <a:t>Assessment of falls risk for the elderly</a:t>
+            </a:r>
+          </a:p>
+          <a:p>
+            <a:pPr marL="285750" indent="-285750">
+              <a:buFontTx/>
+              <a:buChar char="-"/>
+            </a:pPr>
+            <a:r>
+              <a:rPr lang="en-US" sz="1600" dirty="0">
+                <a:solidFill>
+                  <a:schemeClr val="tx1">
+                    <a:lumMod val="75000"/>
+                    <a:lumOff val="25000"/>
+                  </a:schemeClr>
+                </a:solidFill>
+              </a:rPr>
+              <a:t>Requirement related to the current patient medication treatment</a:t>
+            </a:r>
           </a:p>
         </p:txBody>
       </p:sp>

</xml_diff>

<commit_message>
Search parameters added in the labservices.xml page + various enhancements
</commit_message>
<xml_diff>
--- a/input/images-source/LabExampleE6Business.pptx
+++ b/input/images-source/LabExampleE6Business.pptx
@@ -259,7 +259,7 @@
           <a:p>
             <a:fld id="{5BCCFC60-1DD0-4069-8629-C8406330BC3C}" type="datetimeFigureOut">
               <a:rPr lang="fr-FR" smtClean="0"/>
-              <a:t>22/02/2020</a:t>
+              <a:t>24/02/2020</a:t>
             </a:fld>
             <a:endParaRPr lang="fr-FR"/>
           </a:p>
@@ -457,7 +457,7 @@
           <a:p>
             <a:fld id="{5BCCFC60-1DD0-4069-8629-C8406330BC3C}" type="datetimeFigureOut">
               <a:rPr lang="fr-FR" smtClean="0"/>
-              <a:t>22/02/2020</a:t>
+              <a:t>24/02/2020</a:t>
             </a:fld>
             <a:endParaRPr lang="fr-FR"/>
           </a:p>
@@ -665,7 +665,7 @@
           <a:p>
             <a:fld id="{5BCCFC60-1DD0-4069-8629-C8406330BC3C}" type="datetimeFigureOut">
               <a:rPr lang="fr-FR" smtClean="0"/>
-              <a:t>22/02/2020</a:t>
+              <a:t>24/02/2020</a:t>
             </a:fld>
             <a:endParaRPr lang="fr-FR"/>
           </a:p>
@@ -863,7 +863,7 @@
           <a:p>
             <a:fld id="{5BCCFC60-1DD0-4069-8629-C8406330BC3C}" type="datetimeFigureOut">
               <a:rPr lang="fr-FR" smtClean="0"/>
-              <a:t>22/02/2020</a:t>
+              <a:t>24/02/2020</a:t>
             </a:fld>
             <a:endParaRPr lang="fr-FR"/>
           </a:p>
@@ -1138,7 +1138,7 @@
           <a:p>
             <a:fld id="{5BCCFC60-1DD0-4069-8629-C8406330BC3C}" type="datetimeFigureOut">
               <a:rPr lang="fr-FR" smtClean="0"/>
-              <a:t>22/02/2020</a:t>
+              <a:t>24/02/2020</a:t>
             </a:fld>
             <a:endParaRPr lang="fr-FR"/>
           </a:p>
@@ -1403,7 +1403,7 @@
           <a:p>
             <a:fld id="{5BCCFC60-1DD0-4069-8629-C8406330BC3C}" type="datetimeFigureOut">
               <a:rPr lang="fr-FR" smtClean="0"/>
-              <a:t>22/02/2020</a:t>
+              <a:t>24/02/2020</a:t>
             </a:fld>
             <a:endParaRPr lang="fr-FR"/>
           </a:p>
@@ -1815,7 +1815,7 @@
           <a:p>
             <a:fld id="{5BCCFC60-1DD0-4069-8629-C8406330BC3C}" type="datetimeFigureOut">
               <a:rPr lang="fr-FR" smtClean="0"/>
-              <a:t>22/02/2020</a:t>
+              <a:t>24/02/2020</a:t>
             </a:fld>
             <a:endParaRPr lang="fr-FR"/>
           </a:p>
@@ -1956,7 +1956,7 @@
           <a:p>
             <a:fld id="{5BCCFC60-1DD0-4069-8629-C8406330BC3C}" type="datetimeFigureOut">
               <a:rPr lang="fr-FR" smtClean="0"/>
-              <a:t>22/02/2020</a:t>
+              <a:t>24/02/2020</a:t>
             </a:fld>
             <a:endParaRPr lang="fr-FR"/>
           </a:p>
@@ -2069,7 +2069,7 @@
           <a:p>
             <a:fld id="{5BCCFC60-1DD0-4069-8629-C8406330BC3C}" type="datetimeFigureOut">
               <a:rPr lang="fr-FR" smtClean="0"/>
-              <a:t>22/02/2020</a:t>
+              <a:t>24/02/2020</a:t>
             </a:fld>
             <a:endParaRPr lang="fr-FR"/>
           </a:p>
@@ -2380,7 +2380,7 @@
           <a:p>
             <a:fld id="{5BCCFC60-1DD0-4069-8629-C8406330BC3C}" type="datetimeFigureOut">
               <a:rPr lang="fr-FR" smtClean="0"/>
-              <a:t>22/02/2020</a:t>
+              <a:t>24/02/2020</a:t>
             </a:fld>
             <a:endParaRPr lang="fr-FR"/>
           </a:p>
@@ -2668,7 +2668,7 @@
           <a:p>
             <a:fld id="{5BCCFC60-1DD0-4069-8629-C8406330BC3C}" type="datetimeFigureOut">
               <a:rPr lang="fr-FR" smtClean="0"/>
-              <a:t>22/02/2020</a:t>
+              <a:t>24/02/2020</a:t>
             </a:fld>
             <a:endParaRPr lang="fr-FR"/>
           </a:p>
@@ -2909,7 +2909,7 @@
           <a:p>
             <a:fld id="{5BCCFC60-1DD0-4069-8629-C8406330BC3C}" type="datetimeFigureOut">
               <a:rPr lang="fr-FR" smtClean="0"/>
-              <a:t>22/02/2020</a:t>
+              <a:t>24/02/2020</a:t>
             </a:fld>
             <a:endParaRPr lang="fr-FR"/>
           </a:p>
@@ -4344,8 +4344,8 @@
         </p:nvSpPr>
         <p:spPr>
           <a:xfrm>
-            <a:off x="7030611" y="4177310"/>
-            <a:ext cx="4290573" cy="2364567"/>
+            <a:off x="7030611" y="4006197"/>
+            <a:ext cx="4290573" cy="2535680"/>
           </a:xfrm>
           <a:prstGeom prst="foldedCorner">
             <a:avLst>
@@ -4391,6 +4391,19 @@
         <p:txBody>
           <a:bodyPr rtlCol="0" anchor="t" anchorCtr="0"/>
           <a:lstStyle/>
+          <a:p>
+            <a:r>
+              <a:rPr lang="en-US" sz="1600" dirty="0">
+                <a:solidFill>
+                  <a:schemeClr val="tx1">
+                    <a:lumMod val="75000"/>
+                    <a:lumOff val="25000"/>
+                  </a:schemeClr>
+                </a:solidFill>
+              </a:rPr>
+              <a:t>Billing code: {NABM, 1139}</a:t>
+            </a:r>
+          </a:p>
           <a:p>
             <a:r>
               <a:rPr lang="en-US" sz="1600" dirty="0">

</xml_diff>

<commit_message>
Correction of images of example E6
</commit_message>
<xml_diff>
--- a/input/images-source/LabExampleE6Business.pptx
+++ b/input/images-source/LabExampleE6Business.pptx
@@ -259,7 +259,7 @@
           <a:p>
             <a:fld id="{5BCCFC60-1DD0-4069-8629-C8406330BC3C}" type="datetimeFigureOut">
               <a:rPr lang="fr-FR" smtClean="0"/>
-              <a:t>24/02/2020</a:t>
+              <a:t>03/06/2020</a:t>
             </a:fld>
             <a:endParaRPr lang="fr-FR"/>
           </a:p>
@@ -457,7 +457,7 @@
           <a:p>
             <a:fld id="{5BCCFC60-1DD0-4069-8629-C8406330BC3C}" type="datetimeFigureOut">
               <a:rPr lang="fr-FR" smtClean="0"/>
-              <a:t>24/02/2020</a:t>
+              <a:t>03/06/2020</a:t>
             </a:fld>
             <a:endParaRPr lang="fr-FR"/>
           </a:p>
@@ -665,7 +665,7 @@
           <a:p>
             <a:fld id="{5BCCFC60-1DD0-4069-8629-C8406330BC3C}" type="datetimeFigureOut">
               <a:rPr lang="fr-FR" smtClean="0"/>
-              <a:t>24/02/2020</a:t>
+              <a:t>03/06/2020</a:t>
             </a:fld>
             <a:endParaRPr lang="fr-FR"/>
           </a:p>
@@ -863,7 +863,7 @@
           <a:p>
             <a:fld id="{5BCCFC60-1DD0-4069-8629-C8406330BC3C}" type="datetimeFigureOut">
               <a:rPr lang="fr-FR" smtClean="0"/>
-              <a:t>24/02/2020</a:t>
+              <a:t>03/06/2020</a:t>
             </a:fld>
             <a:endParaRPr lang="fr-FR"/>
           </a:p>
@@ -1138,7 +1138,7 @@
           <a:p>
             <a:fld id="{5BCCFC60-1DD0-4069-8629-C8406330BC3C}" type="datetimeFigureOut">
               <a:rPr lang="fr-FR" smtClean="0"/>
-              <a:t>24/02/2020</a:t>
+              <a:t>03/06/2020</a:t>
             </a:fld>
             <a:endParaRPr lang="fr-FR"/>
           </a:p>
@@ -1403,7 +1403,7 @@
           <a:p>
             <a:fld id="{5BCCFC60-1DD0-4069-8629-C8406330BC3C}" type="datetimeFigureOut">
               <a:rPr lang="fr-FR" smtClean="0"/>
-              <a:t>24/02/2020</a:t>
+              <a:t>03/06/2020</a:t>
             </a:fld>
             <a:endParaRPr lang="fr-FR"/>
           </a:p>
@@ -1815,7 +1815,7 @@
           <a:p>
             <a:fld id="{5BCCFC60-1DD0-4069-8629-C8406330BC3C}" type="datetimeFigureOut">
               <a:rPr lang="fr-FR" smtClean="0"/>
-              <a:t>24/02/2020</a:t>
+              <a:t>03/06/2020</a:t>
             </a:fld>
             <a:endParaRPr lang="fr-FR"/>
           </a:p>
@@ -1956,7 +1956,7 @@
           <a:p>
             <a:fld id="{5BCCFC60-1DD0-4069-8629-C8406330BC3C}" type="datetimeFigureOut">
               <a:rPr lang="fr-FR" smtClean="0"/>
-              <a:t>24/02/2020</a:t>
+              <a:t>03/06/2020</a:t>
             </a:fld>
             <a:endParaRPr lang="fr-FR"/>
           </a:p>
@@ -2069,7 +2069,7 @@
           <a:p>
             <a:fld id="{5BCCFC60-1DD0-4069-8629-C8406330BC3C}" type="datetimeFigureOut">
               <a:rPr lang="fr-FR" smtClean="0"/>
-              <a:t>24/02/2020</a:t>
+              <a:t>03/06/2020</a:t>
             </a:fld>
             <a:endParaRPr lang="fr-FR"/>
           </a:p>
@@ -2380,7 +2380,7 @@
           <a:p>
             <a:fld id="{5BCCFC60-1DD0-4069-8629-C8406330BC3C}" type="datetimeFigureOut">
               <a:rPr lang="fr-FR" smtClean="0"/>
-              <a:t>24/02/2020</a:t>
+              <a:t>03/06/2020</a:t>
             </a:fld>
             <a:endParaRPr lang="fr-FR"/>
           </a:p>
@@ -2668,7 +2668,7 @@
           <a:p>
             <a:fld id="{5BCCFC60-1DD0-4069-8629-C8406330BC3C}" type="datetimeFigureOut">
               <a:rPr lang="fr-FR" smtClean="0"/>
-              <a:t>24/02/2020</a:t>
+              <a:t>03/06/2020</a:t>
             </a:fld>
             <a:endParaRPr lang="fr-FR"/>
           </a:p>
@@ -2909,7 +2909,7 @@
           <a:p>
             <a:fld id="{5BCCFC60-1DD0-4069-8629-C8406330BC3C}" type="datetimeFigureOut">
               <a:rPr lang="fr-FR" smtClean="0"/>
-              <a:t>24/02/2020</a:t>
+              <a:t>03/06/2020</a:t>
             </a:fld>
             <a:endParaRPr lang="fr-FR"/>
           </a:p>
@@ -4045,7 +4045,7 @@
             <a:pPr algn="ctr"/>
             <a:r>
               <a:rPr lang="en-US" sz="1600" dirty="0"/>
-              <a:t>LOINC 67098-4</a:t>
+              <a:t>LOINC 56820-4</a:t>
             </a:r>
           </a:p>
           <a:p>
@@ -4130,7 +4130,7 @@
             <a:pPr algn="ctr"/>
             <a:r>
               <a:rPr lang="en-US" dirty="0"/>
-              <a:t>Reason for testing</a:t>
+              <a:t>Problem context</a:t>
             </a:r>
             <a:endParaRPr lang="en-US" sz="2400" dirty="0"/>
           </a:p>

</xml_diff>